<commit_message>
Kate: updating the image/text for the analogy again
</commit_message>
<xml_diff>
--- a/code/scenarios/cdsr/trunk/papers/AAAI2012/images/outline_newDiagram.pptx
+++ b/code/scenarios/cdsr/trunk/papers/AAAI2012/images/outline_newDiagram.pptx
@@ -298,7 +298,7 @@
             <a:fld id="{03237391-0CBA-0847-A0DC-E10AED3E99EF}" type="datetimeFigureOut">
               <a:rPr lang="en-US" smtClean="0"/>
               <a:pPr/>
-              <a:t>1/23/12</a:t>
+              <a:t>1/24/12</a:t>
             </a:fld>
             <a:endParaRPr lang="en-US"/>
           </a:p>
@@ -465,7 +465,7 @@
             <a:fld id="{03237391-0CBA-0847-A0DC-E10AED3E99EF}" type="datetimeFigureOut">
               <a:rPr lang="en-US" smtClean="0"/>
               <a:pPr/>
-              <a:t>1/23/12</a:t>
+              <a:t>1/24/12</a:t>
             </a:fld>
             <a:endParaRPr lang="en-US"/>
           </a:p>
@@ -642,7 +642,7 @@
             <a:fld id="{03237391-0CBA-0847-A0DC-E10AED3E99EF}" type="datetimeFigureOut">
               <a:rPr lang="en-US" smtClean="0"/>
               <a:pPr/>
-              <a:t>1/23/12</a:t>
+              <a:t>1/24/12</a:t>
             </a:fld>
             <a:endParaRPr lang="en-US"/>
           </a:p>
@@ -809,7 +809,7 @@
             <a:fld id="{03237391-0CBA-0847-A0DC-E10AED3E99EF}" type="datetimeFigureOut">
               <a:rPr lang="en-US" smtClean="0"/>
               <a:pPr/>
-              <a:t>1/23/12</a:t>
+              <a:t>1/24/12</a:t>
             </a:fld>
             <a:endParaRPr lang="en-US"/>
           </a:p>
@@ -1052,7 +1052,7 @@
             <a:fld id="{03237391-0CBA-0847-A0DC-E10AED3E99EF}" type="datetimeFigureOut">
               <a:rPr lang="en-US" smtClean="0"/>
               <a:pPr/>
-              <a:t>1/23/12</a:t>
+              <a:t>1/24/12</a:t>
             </a:fld>
             <a:endParaRPr lang="en-US"/>
           </a:p>
@@ -1337,7 +1337,7 @@
             <a:fld id="{03237391-0CBA-0847-A0DC-E10AED3E99EF}" type="datetimeFigureOut">
               <a:rPr lang="en-US" smtClean="0"/>
               <a:pPr/>
-              <a:t>1/23/12</a:t>
+              <a:t>1/24/12</a:t>
             </a:fld>
             <a:endParaRPr lang="en-US"/>
           </a:p>
@@ -1756,7 +1756,7 @@
             <a:fld id="{03237391-0CBA-0847-A0DC-E10AED3E99EF}" type="datetimeFigureOut">
               <a:rPr lang="en-US" smtClean="0"/>
               <a:pPr/>
-              <a:t>1/23/12</a:t>
+              <a:t>1/24/12</a:t>
             </a:fld>
             <a:endParaRPr lang="en-US"/>
           </a:p>
@@ -1871,7 +1871,7 @@
             <a:fld id="{03237391-0CBA-0847-A0DC-E10AED3E99EF}" type="datetimeFigureOut">
               <a:rPr lang="en-US" smtClean="0"/>
               <a:pPr/>
-              <a:t>1/23/12</a:t>
+              <a:t>1/24/12</a:t>
             </a:fld>
             <a:endParaRPr lang="en-US"/>
           </a:p>
@@ -1963,7 +1963,7 @@
             <a:fld id="{03237391-0CBA-0847-A0DC-E10AED3E99EF}" type="datetimeFigureOut">
               <a:rPr lang="en-US" smtClean="0"/>
               <a:pPr/>
-              <a:t>1/23/12</a:t>
+              <a:t>1/24/12</a:t>
             </a:fld>
             <a:endParaRPr lang="en-US"/>
           </a:p>
@@ -2237,7 +2237,7 @@
             <a:fld id="{03237391-0CBA-0847-A0DC-E10AED3E99EF}" type="datetimeFigureOut">
               <a:rPr lang="en-US" smtClean="0"/>
               <a:pPr/>
-              <a:t>1/23/12</a:t>
+              <a:t>1/24/12</a:t>
             </a:fld>
             <a:endParaRPr lang="en-US"/>
           </a:p>
@@ -2487,7 +2487,7 @@
             <a:fld id="{03237391-0CBA-0847-A0DC-E10AED3E99EF}" type="datetimeFigureOut">
               <a:rPr lang="en-US" smtClean="0"/>
               <a:pPr/>
-              <a:t>1/23/12</a:t>
+              <a:t>1/24/12</a:t>
             </a:fld>
             <a:endParaRPr lang="en-US"/>
           </a:p>
@@ -2697,7 +2697,7 @@
             <a:fld id="{03237391-0CBA-0847-A0DC-E10AED3E99EF}" type="datetimeFigureOut">
               <a:rPr lang="en-US" smtClean="0"/>
               <a:pPr/>
-              <a:t>1/23/12</a:t>
+              <a:t>1/24/12</a:t>
             </a:fld>
             <a:endParaRPr lang="en-US"/>
           </a:p>
@@ -5341,7 +5341,7 @@
         </p:nvSpPr>
         <p:spPr>
           <a:xfrm>
-            <a:off x="1437623" y="1152144"/>
+            <a:off x="1379894" y="1152144"/>
             <a:ext cx="987552" cy="285366"/>
           </a:xfrm>
           <a:prstGeom prst="rect">
@@ -5766,9 +5766,9 @@
           <p:nvPr/>
         </p:nvCxnSpPr>
         <p:spPr>
-          <a:xfrm flipV="1">
-            <a:off x="1751839" y="1437510"/>
-            <a:ext cx="179560" cy="205170"/>
+          <a:xfrm rot="5400000" flipH="1" flipV="1">
+            <a:off x="1710169" y="1479180"/>
+            <a:ext cx="205170" cy="121831"/>
           </a:xfrm>
           <a:prstGeom prst="straightConnector1">
             <a:avLst/>
@@ -5948,16 +5948,8 @@
             <a:avLst/>
           </a:prstGeom>
           <a:solidFill>
-            <a:schemeClr val="accent2"/>
+            <a:schemeClr val="accent1"/>
           </a:solidFill>
-          <a:ln w="38100">
-            <a:solidFill>
-              <a:schemeClr val="accent2">
-                <a:lumMod val="50000"/>
-              </a:schemeClr>
-            </a:solidFill>
-            <a:prstDash val="sysDash"/>
-          </a:ln>
         </p:spPr>
         <p:style>
           <a:lnRef idx="1">
@@ -5980,7 +5972,7 @@
             <a:pPr algn="ctr"/>
             <a:r>
               <a:rPr lang="en-US" sz="1400" dirty="0" smtClean="0"/>
-              <a:t>CDSR1</a:t>
+              <a:t>CDSR2</a:t>
             </a:r>
             <a:endParaRPr lang="en-US" sz="1400" dirty="0"/>
           </a:p>
@@ -6042,16 +6034,8 @@
             <a:avLst/>
           </a:prstGeom>
           <a:solidFill>
-            <a:schemeClr val="accent2"/>
+            <a:schemeClr val="accent1"/>
           </a:solidFill>
-          <a:ln w="38100">
-            <a:solidFill>
-              <a:schemeClr val="accent2">
-                <a:lumMod val="50000"/>
-              </a:schemeClr>
-            </a:solidFill>
-            <a:prstDash val="sysDash"/>
-          </a:ln>
         </p:spPr>
         <p:style>
           <a:lnRef idx="1">
@@ -6105,12 +6089,6 @@
             <a:avLst/>
           </a:prstGeom>
           <a:ln>
-            <a:solidFill>
-              <a:schemeClr val="accent2">
-                <a:lumMod val="75000"/>
-              </a:schemeClr>
-            </a:solidFill>
-            <a:prstDash val="sysDash"/>
             <a:tailEnd type="arrow"/>
           </a:ln>
         </p:spPr>
@@ -6144,16 +6122,8 @@
             <a:avLst/>
           </a:prstGeom>
           <a:solidFill>
-            <a:schemeClr val="accent2"/>
+            <a:schemeClr val="accent1"/>
           </a:solidFill>
-          <a:ln w="38100">
-            <a:solidFill>
-              <a:schemeClr val="accent2">
-                <a:lumMod val="50000"/>
-              </a:schemeClr>
-            </a:solidFill>
-            <a:prstDash val="sysDash"/>
-          </a:ln>
         </p:spPr>
         <p:style>
           <a:lnRef idx="1">
@@ -6200,12 +6170,6 @@
             <a:avLst/>
           </a:prstGeom>
           <a:ln>
-            <a:solidFill>
-              <a:schemeClr val="accent2">
-                <a:lumMod val="75000"/>
-              </a:schemeClr>
-            </a:solidFill>
-            <a:prstDash val="sysDash"/>
             <a:tailEnd type="arrow"/>
           </a:ln>
         </p:spPr>
@@ -6954,6 +6918,12 @@
             <a:avLst/>
           </a:prstGeom>
           <a:ln>
+            <a:solidFill>
+              <a:schemeClr val="accent2">
+                <a:lumMod val="75000"/>
+              </a:schemeClr>
+            </a:solidFill>
+            <a:prstDash val="sysDash"/>
             <a:tailEnd type="arrow"/>
           </a:ln>
         </p:spPr>
@@ -7098,7 +7068,7 @@
         </p:nvSpPr>
         <p:spPr>
           <a:xfrm>
-            <a:off x="1255506" y="4665354"/>
+            <a:off x="5368360" y="2795009"/>
             <a:ext cx="2339337" cy="369332"/>
           </a:xfrm>
           <a:prstGeom prst="rect">
@@ -7128,8 +7098,8 @@
         </p:nvSpPr>
         <p:spPr>
           <a:xfrm>
-            <a:off x="1218873" y="2660348"/>
-            <a:ext cx="2162886" cy="2189672"/>
+            <a:off x="1218873" y="2660349"/>
+            <a:ext cx="2162886" cy="829297"/>
           </a:xfrm>
           <a:prstGeom prst="roundRect">
             <a:avLst/>
@@ -7206,16 +7176,477 @@
           </a:fontRef>
         </p:style>
       </p:cxnSp>
+      <p:sp>
+        <p:nvSpPr>
+          <p:cNvPr id="212" name="TextBox 211"/>
+          <p:cNvSpPr txBox="1"/>
+          <p:nvPr/>
+        </p:nvSpPr>
+        <p:spPr>
+          <a:xfrm rot="16200000">
+            <a:off x="4344195" y="2566897"/>
+            <a:ext cx="1537721" cy="307777"/>
+          </a:xfrm>
+          <a:prstGeom prst="rect">
+            <a:avLst/>
+          </a:prstGeom>
+          <a:noFill/>
+        </p:spPr>
+        <p:txBody>
+          <a:bodyPr wrap="square" rtlCol="0">
+            <a:spAutoFit/>
+          </a:bodyPr>
+          <a:lstStyle/>
+          <a:p>
+            <a:r>
+              <a:rPr lang="en-US" sz="1400" b="1" dirty="0" smtClean="0"/>
+              <a:t>correspondences</a:t>
+            </a:r>
+            <a:endParaRPr lang="en-US" sz="1400" b="1" dirty="0"/>
+          </a:p>
+        </p:txBody>
+      </p:sp>
+      <p:sp>
+        <p:nvSpPr>
+          <p:cNvPr id="88" name="Rounded Rectangle 87"/>
+          <p:cNvSpPr/>
+          <p:nvPr/>
+        </p:nvSpPr>
+        <p:spPr>
+          <a:xfrm>
+            <a:off x="3381757" y="2660348"/>
+            <a:ext cx="1848611" cy="602822"/>
+          </a:xfrm>
+          <a:prstGeom prst="roundRect">
+            <a:avLst/>
+          </a:prstGeom>
+          <a:solidFill>
+            <a:schemeClr val="bg1">
+              <a:lumMod val="85000"/>
+              <a:alpha val="21000"/>
+            </a:schemeClr>
+          </a:solidFill>
+          <a:ln>
+            <a:noFill/>
+          </a:ln>
+        </p:spPr>
+        <p:style>
+          <a:lnRef idx="1">
+            <a:schemeClr val="accent1"/>
+          </a:lnRef>
+          <a:fillRef idx="3">
+            <a:schemeClr val="accent1"/>
+          </a:fillRef>
+          <a:effectRef idx="2">
+            <a:schemeClr val="accent1"/>
+          </a:effectRef>
+          <a:fontRef idx="minor">
+            <a:schemeClr val="lt1"/>
+          </a:fontRef>
+        </p:style>
+        <p:txBody>
+          <a:bodyPr rtlCol="0" anchor="ctr"/>
+          <a:lstStyle/>
+          <a:p>
+            <a:pPr algn="ctr"/>
+            <a:endParaRPr lang="en-US"/>
+          </a:p>
+        </p:txBody>
+      </p:sp>
+      <p:sp>
+        <p:nvSpPr>
+          <p:cNvPr id="91" name="Rectangle 90"/>
+          <p:cNvSpPr/>
+          <p:nvPr/>
+        </p:nvSpPr>
+        <p:spPr>
+          <a:xfrm>
+            <a:off x="3503677" y="1773936"/>
+            <a:ext cx="818386" cy="274320"/>
+          </a:xfrm>
+          <a:prstGeom prst="rect">
+            <a:avLst/>
+          </a:prstGeom>
+          <a:solidFill>
+            <a:schemeClr val="accent1"/>
+          </a:solidFill>
+        </p:spPr>
+        <p:style>
+          <a:lnRef idx="1">
+            <a:schemeClr val="accent1"/>
+          </a:lnRef>
+          <a:fillRef idx="3">
+            <a:schemeClr val="accent1"/>
+          </a:fillRef>
+          <a:effectRef idx="2">
+            <a:schemeClr val="accent1"/>
+          </a:effectRef>
+          <a:fontRef idx="minor">
+            <a:schemeClr val="lt1"/>
+          </a:fontRef>
+        </p:style>
+        <p:txBody>
+          <a:bodyPr rtlCol="0" anchor="ctr"/>
+          <a:lstStyle/>
+          <a:p>
+            <a:pPr algn="ctr"/>
+            <a:r>
+              <a:rPr lang="en-US" sz="1400" dirty="0" smtClean="0"/>
+              <a:t>Desk1</a:t>
+            </a:r>
+            <a:endParaRPr lang="en-US" sz="1400" dirty="0"/>
+          </a:p>
+        </p:txBody>
+      </p:sp>
+      <p:sp>
+        <p:nvSpPr>
+          <p:cNvPr id="92" name="Rectangle 91"/>
+          <p:cNvSpPr/>
+          <p:nvPr/>
+        </p:nvSpPr>
+        <p:spPr>
+          <a:xfrm>
+            <a:off x="4549974" y="1789176"/>
+            <a:ext cx="818386" cy="274320"/>
+          </a:xfrm>
+          <a:prstGeom prst="rect">
+            <a:avLst/>
+          </a:prstGeom>
+          <a:solidFill>
+            <a:schemeClr val="accent1"/>
+          </a:solidFill>
+        </p:spPr>
+        <p:style>
+          <a:lnRef idx="1">
+            <a:schemeClr val="accent1"/>
+          </a:lnRef>
+          <a:fillRef idx="3">
+            <a:schemeClr val="accent1"/>
+          </a:fillRef>
+          <a:effectRef idx="2">
+            <a:schemeClr val="accent1"/>
+          </a:effectRef>
+          <a:fontRef idx="minor">
+            <a:schemeClr val="lt1"/>
+          </a:fontRef>
+        </p:style>
+        <p:txBody>
+          <a:bodyPr rtlCol="0" anchor="ctr"/>
+          <a:lstStyle/>
+          <a:p>
+            <a:pPr algn="ctr"/>
+            <a:r>
+              <a:rPr lang="en-US" sz="1400" dirty="0" smtClean="0"/>
+              <a:t>Desk2</a:t>
+            </a:r>
+            <a:endParaRPr lang="en-US" sz="1400" dirty="0"/>
+          </a:p>
+        </p:txBody>
+      </p:sp>
+      <p:sp>
+        <p:nvSpPr>
+          <p:cNvPr id="93" name="Rectangle 92"/>
+          <p:cNvSpPr/>
+          <p:nvPr/>
+        </p:nvSpPr>
+        <p:spPr>
+          <a:xfrm>
+            <a:off x="5863586" y="1758412"/>
+            <a:ext cx="818386" cy="274320"/>
+          </a:xfrm>
+          <a:prstGeom prst="rect">
+            <a:avLst/>
+          </a:prstGeom>
+          <a:solidFill>
+            <a:schemeClr val="accent1"/>
+          </a:solidFill>
+        </p:spPr>
+        <p:style>
+          <a:lnRef idx="1">
+            <a:schemeClr val="accent1"/>
+          </a:lnRef>
+          <a:fillRef idx="3">
+            <a:schemeClr val="accent1"/>
+          </a:fillRef>
+          <a:effectRef idx="2">
+            <a:schemeClr val="accent1"/>
+          </a:effectRef>
+          <a:fontRef idx="minor">
+            <a:schemeClr val="lt1"/>
+          </a:fontRef>
+        </p:style>
+        <p:txBody>
+          <a:bodyPr rtlCol="0" anchor="ctr"/>
+          <a:lstStyle/>
+          <a:p>
+            <a:pPr algn="ctr"/>
+            <a:r>
+              <a:rPr lang="en-US" sz="1400" dirty="0" smtClean="0"/>
+              <a:t>Desk4</a:t>
+            </a:r>
+            <a:endParaRPr lang="en-US" sz="1400" dirty="0"/>
+          </a:p>
+        </p:txBody>
+      </p:sp>
+      <p:sp>
+        <p:nvSpPr>
+          <p:cNvPr id="94" name="Rectangle 93"/>
+          <p:cNvSpPr/>
+          <p:nvPr/>
+        </p:nvSpPr>
+        <p:spPr>
+          <a:xfrm>
+            <a:off x="7018017" y="1758412"/>
+            <a:ext cx="818386" cy="274320"/>
+          </a:xfrm>
+          <a:prstGeom prst="rect">
+            <a:avLst/>
+          </a:prstGeom>
+          <a:solidFill>
+            <a:schemeClr val="accent1"/>
+          </a:solidFill>
+        </p:spPr>
+        <p:style>
+          <a:lnRef idx="1">
+            <a:schemeClr val="accent1"/>
+          </a:lnRef>
+          <a:fillRef idx="3">
+            <a:schemeClr val="accent1"/>
+          </a:fillRef>
+          <a:effectRef idx="2">
+            <a:schemeClr val="accent1"/>
+          </a:effectRef>
+          <a:fontRef idx="minor">
+            <a:schemeClr val="lt1"/>
+          </a:fontRef>
+        </p:style>
+        <p:txBody>
+          <a:bodyPr rtlCol="0" anchor="ctr"/>
+          <a:lstStyle/>
+          <a:p>
+            <a:pPr algn="ctr"/>
+            <a:r>
+              <a:rPr lang="en-US" sz="1400" dirty="0" smtClean="0"/>
+              <a:t>Desk5</a:t>
+            </a:r>
+            <a:endParaRPr lang="en-US" sz="1400" dirty="0"/>
+          </a:p>
+        </p:txBody>
+      </p:sp>
+      <p:sp>
+        <p:nvSpPr>
+          <p:cNvPr id="95" name="Rectangle 94"/>
+          <p:cNvSpPr/>
+          <p:nvPr/>
+        </p:nvSpPr>
+        <p:spPr>
+          <a:xfrm>
+            <a:off x="3503677" y="4187192"/>
+            <a:ext cx="818386" cy="274320"/>
+          </a:xfrm>
+          <a:prstGeom prst="rect">
+            <a:avLst/>
+          </a:prstGeom>
+          <a:solidFill>
+            <a:schemeClr val="accent1"/>
+          </a:solidFill>
+        </p:spPr>
+        <p:style>
+          <a:lnRef idx="1">
+            <a:schemeClr val="accent1"/>
+          </a:lnRef>
+          <a:fillRef idx="3">
+            <a:schemeClr val="accent1"/>
+          </a:fillRef>
+          <a:effectRef idx="2">
+            <a:schemeClr val="accent1"/>
+          </a:effectRef>
+          <a:fontRef idx="minor">
+            <a:schemeClr val="lt1"/>
+          </a:fontRef>
+        </p:style>
+        <p:txBody>
+          <a:bodyPr rtlCol="0" anchor="ctr"/>
+          <a:lstStyle/>
+          <a:p>
+            <a:pPr algn="ctr"/>
+            <a:r>
+              <a:rPr lang="en-US" sz="1400" dirty="0" smtClean="0"/>
+              <a:t>Desk11</a:t>
+            </a:r>
+            <a:endParaRPr lang="en-US" sz="1400" dirty="0"/>
+          </a:p>
+        </p:txBody>
+      </p:sp>
+      <p:sp>
+        <p:nvSpPr>
+          <p:cNvPr id="96" name="Rectangle 95"/>
+          <p:cNvSpPr/>
+          <p:nvPr/>
+        </p:nvSpPr>
+        <p:spPr>
+          <a:xfrm>
+            <a:off x="4673350" y="4176763"/>
+            <a:ext cx="818386" cy="274320"/>
+          </a:xfrm>
+          <a:prstGeom prst="rect">
+            <a:avLst/>
+          </a:prstGeom>
+          <a:solidFill>
+            <a:schemeClr val="accent1"/>
+          </a:solidFill>
+        </p:spPr>
+        <p:style>
+          <a:lnRef idx="1">
+            <a:schemeClr val="accent1"/>
+          </a:lnRef>
+          <a:fillRef idx="3">
+            <a:schemeClr val="accent1"/>
+          </a:fillRef>
+          <a:effectRef idx="2">
+            <a:schemeClr val="accent1"/>
+          </a:effectRef>
+          <a:fontRef idx="minor">
+            <a:schemeClr val="lt1"/>
+          </a:fontRef>
+        </p:style>
+        <p:txBody>
+          <a:bodyPr rtlCol="0" anchor="ctr"/>
+          <a:lstStyle/>
+          <a:p>
+            <a:pPr algn="ctr"/>
+            <a:r>
+              <a:rPr lang="en-US" sz="1400" dirty="0" smtClean="0"/>
+              <a:t>Desk12</a:t>
+            </a:r>
+            <a:endParaRPr lang="en-US" sz="1400" dirty="0"/>
+          </a:p>
+        </p:txBody>
+      </p:sp>
       <p:cxnSp>
         <p:nvCxnSpPr>
-          <p:cNvPr id="207" name="Straight Arrow Connector 206"/>
+          <p:cNvPr id="199" name="Straight Arrow Connector 198"/>
           <p:cNvCxnSpPr/>
           <p:nvPr/>
         </p:nvCxnSpPr>
         <p:spPr>
           <a:xfrm>
-            <a:off x="2921511" y="2087692"/>
-            <a:ext cx="30481" cy="2199606"/>
+            <a:off x="3685032" y="1372832"/>
+            <a:ext cx="36576" cy="2086118"/>
+          </a:xfrm>
+          <a:prstGeom prst="straightConnector1">
+            <a:avLst/>
+          </a:prstGeom>
+          <a:ln w="12700">
+            <a:solidFill>
+              <a:schemeClr val="tx1"/>
+            </a:solidFill>
+            <a:prstDash val="sysDash"/>
+            <a:headEnd type="arrow"/>
+            <a:tailEnd type="arrow"/>
+          </a:ln>
+        </p:spPr>
+        <p:style>
+          <a:lnRef idx="2">
+            <a:schemeClr val="accent1"/>
+          </a:lnRef>
+          <a:fillRef idx="0">
+            <a:schemeClr val="accent1"/>
+          </a:fillRef>
+          <a:effectRef idx="1">
+            <a:schemeClr val="accent1"/>
+          </a:effectRef>
+          <a:fontRef idx="minor">
+            <a:schemeClr val="tx1"/>
+          </a:fontRef>
+        </p:style>
+      </p:cxnSp>
+      <p:cxnSp>
+        <p:nvCxnSpPr>
+          <p:cNvPr id="198" name="Straight Arrow Connector 197"/>
+          <p:cNvCxnSpPr/>
+          <p:nvPr/>
+        </p:nvCxnSpPr>
+        <p:spPr>
+          <a:xfrm>
+            <a:off x="5230368" y="1372832"/>
+            <a:ext cx="36576" cy="2086118"/>
+          </a:xfrm>
+          <a:prstGeom prst="straightConnector1">
+            <a:avLst/>
+          </a:prstGeom>
+          <a:ln w="12700">
+            <a:solidFill>
+              <a:schemeClr val="tx1"/>
+            </a:solidFill>
+            <a:prstDash val="sysDash"/>
+            <a:headEnd type="arrow"/>
+            <a:tailEnd type="arrow"/>
+          </a:ln>
+        </p:spPr>
+        <p:style>
+          <a:lnRef idx="2">
+            <a:schemeClr val="accent1"/>
+          </a:lnRef>
+          <a:fillRef idx="0">
+            <a:schemeClr val="accent1"/>
+          </a:fillRef>
+          <a:effectRef idx="1">
+            <a:schemeClr val="accent1"/>
+          </a:effectRef>
+          <a:fontRef idx="minor">
+            <a:schemeClr val="tx1"/>
+          </a:fontRef>
+        </p:style>
+      </p:cxnSp>
+      <p:cxnSp>
+        <p:nvCxnSpPr>
+          <p:cNvPr id="63" name="Straight Arrow Connector 62"/>
+          <p:cNvCxnSpPr/>
+          <p:nvPr/>
+        </p:nvCxnSpPr>
+        <p:spPr>
+          <a:xfrm>
+            <a:off x="1565638" y="2101074"/>
+            <a:ext cx="36576" cy="2086118"/>
+          </a:xfrm>
+          <a:prstGeom prst="straightConnector1">
+            <a:avLst/>
+          </a:prstGeom>
+          <a:ln w="12700">
+            <a:solidFill>
+              <a:schemeClr val="tx1"/>
+            </a:solidFill>
+            <a:prstDash val="sysDash"/>
+            <a:headEnd type="arrow"/>
+            <a:tailEnd type="arrow"/>
+          </a:ln>
+        </p:spPr>
+        <p:style>
+          <a:lnRef idx="2">
+            <a:schemeClr val="accent1"/>
+          </a:lnRef>
+          <a:fillRef idx="0">
+            <a:schemeClr val="accent1"/>
+          </a:fillRef>
+          <a:effectRef idx="1">
+            <a:schemeClr val="accent1"/>
+          </a:effectRef>
+          <a:fontRef idx="minor">
+            <a:schemeClr val="tx1"/>
+          </a:fontRef>
+        </p:style>
+      </p:cxnSp>
+      <p:cxnSp>
+        <p:nvCxnSpPr>
+          <p:cNvPr id="64" name="Straight Arrow Connector 63"/>
+          <p:cNvCxnSpPr/>
+          <p:nvPr/>
+        </p:nvCxnSpPr>
+        <p:spPr>
+          <a:xfrm>
+            <a:off x="3594843" y="691942"/>
+            <a:ext cx="30481" cy="2045201"/>
           </a:xfrm>
           <a:prstGeom prst="straightConnector1">
             <a:avLst/>
@@ -7247,439 +7678,14 @@
       </p:cxnSp>
       <p:cxnSp>
         <p:nvCxnSpPr>
-          <p:cNvPr id="209" name="Straight Arrow Connector 208"/>
+          <p:cNvPr id="66" name="Straight Arrow Connector 65"/>
           <p:cNvCxnSpPr/>
           <p:nvPr/>
         </p:nvCxnSpPr>
         <p:spPr>
-          <a:xfrm>
-            <a:off x="1498581" y="1437510"/>
-            <a:ext cx="30481" cy="2227996"/>
-          </a:xfrm>
-          <a:prstGeom prst="straightConnector1">
-            <a:avLst/>
-          </a:prstGeom>
-          <a:ln w="34925">
-            <a:solidFill>
-              <a:schemeClr val="accent4">
-                <a:lumMod val="75000"/>
-              </a:schemeClr>
-            </a:solidFill>
-            <a:prstDash val="sysDot"/>
-            <a:tailEnd type="arrow"/>
-          </a:ln>
-        </p:spPr>
-        <p:style>
-          <a:lnRef idx="2">
-            <a:schemeClr val="accent1"/>
-          </a:lnRef>
-          <a:fillRef idx="0">
-            <a:schemeClr val="accent1"/>
-          </a:fillRef>
-          <a:effectRef idx="1">
-            <a:schemeClr val="accent1"/>
-          </a:effectRef>
-          <a:fontRef idx="minor">
-            <a:schemeClr val="tx1"/>
-          </a:fontRef>
-        </p:style>
-      </p:cxnSp>
-      <p:cxnSp>
-        <p:nvCxnSpPr>
-          <p:cNvPr id="211" name="Straight Arrow Connector 210"/>
-          <p:cNvCxnSpPr/>
-          <p:nvPr/>
-        </p:nvCxnSpPr>
-        <p:spPr>
-          <a:xfrm>
-            <a:off x="1900918" y="2110843"/>
-            <a:ext cx="30481" cy="2045201"/>
-          </a:xfrm>
-          <a:prstGeom prst="straightConnector1">
-            <a:avLst/>
-          </a:prstGeom>
-          <a:ln w="34925">
-            <a:solidFill>
-              <a:schemeClr val="accent4">
-                <a:lumMod val="75000"/>
-              </a:schemeClr>
-            </a:solidFill>
-            <a:prstDash val="sysDot"/>
-            <a:tailEnd type="arrow"/>
-          </a:ln>
-        </p:spPr>
-        <p:style>
-          <a:lnRef idx="2">
-            <a:schemeClr val="accent1"/>
-          </a:lnRef>
-          <a:fillRef idx="0">
-            <a:schemeClr val="accent1"/>
-          </a:fillRef>
-          <a:effectRef idx="1">
-            <a:schemeClr val="accent1"/>
-          </a:effectRef>
-          <a:fontRef idx="minor">
-            <a:schemeClr val="tx1"/>
-          </a:fontRef>
-        </p:style>
-      </p:cxnSp>
-      <p:sp>
-        <p:nvSpPr>
-          <p:cNvPr id="212" name="TextBox 211"/>
-          <p:cNvSpPr txBox="1"/>
-          <p:nvPr/>
-        </p:nvSpPr>
-        <p:spPr>
-          <a:xfrm rot="16200000">
-            <a:off x="4344195" y="2566897"/>
-            <a:ext cx="1537721" cy="307777"/>
-          </a:xfrm>
-          <a:prstGeom prst="rect">
-            <a:avLst/>
-          </a:prstGeom>
-          <a:noFill/>
-        </p:spPr>
-        <p:txBody>
-          <a:bodyPr wrap="square" rtlCol="0">
-            <a:spAutoFit/>
-          </a:bodyPr>
-          <a:lstStyle/>
-          <a:p>
-            <a:r>
-              <a:rPr lang="en-US" sz="1400" b="1" dirty="0" smtClean="0"/>
-              <a:t>correspondences</a:t>
-            </a:r>
-            <a:endParaRPr lang="en-US" sz="1400" b="1" dirty="0"/>
-          </a:p>
-        </p:txBody>
-      </p:sp>
-      <p:sp>
-        <p:nvSpPr>
-          <p:cNvPr id="88" name="Rounded Rectangle 87"/>
-          <p:cNvSpPr/>
-          <p:nvPr/>
-        </p:nvSpPr>
-        <p:spPr>
-          <a:xfrm>
-            <a:off x="3381757" y="2660348"/>
-            <a:ext cx="1848611" cy="725458"/>
-          </a:xfrm>
-          <a:prstGeom prst="roundRect">
-            <a:avLst/>
-          </a:prstGeom>
-          <a:solidFill>
-            <a:schemeClr val="bg1">
-              <a:lumMod val="85000"/>
-              <a:alpha val="21000"/>
-            </a:schemeClr>
-          </a:solidFill>
-          <a:ln>
-            <a:noFill/>
-          </a:ln>
-        </p:spPr>
-        <p:style>
-          <a:lnRef idx="1">
-            <a:schemeClr val="accent1"/>
-          </a:lnRef>
-          <a:fillRef idx="3">
-            <a:schemeClr val="accent1"/>
-          </a:fillRef>
-          <a:effectRef idx="2">
-            <a:schemeClr val="accent1"/>
-          </a:effectRef>
-          <a:fontRef idx="minor">
-            <a:schemeClr val="lt1"/>
-          </a:fontRef>
-        </p:style>
-        <p:txBody>
-          <a:bodyPr rtlCol="0" anchor="ctr"/>
-          <a:lstStyle/>
-          <a:p>
-            <a:pPr algn="ctr"/>
-            <a:endParaRPr lang="en-US"/>
-          </a:p>
-        </p:txBody>
-      </p:sp>
-      <p:sp>
-        <p:nvSpPr>
-          <p:cNvPr id="91" name="Rectangle 90"/>
-          <p:cNvSpPr/>
-          <p:nvPr/>
-        </p:nvSpPr>
-        <p:spPr>
-          <a:xfrm>
-            <a:off x="3503677" y="1773936"/>
-            <a:ext cx="818386" cy="274320"/>
-          </a:xfrm>
-          <a:prstGeom prst="rect">
-            <a:avLst/>
-          </a:prstGeom>
-          <a:solidFill>
-            <a:schemeClr val="accent1"/>
-          </a:solidFill>
-        </p:spPr>
-        <p:style>
-          <a:lnRef idx="1">
-            <a:schemeClr val="accent1"/>
-          </a:lnRef>
-          <a:fillRef idx="3">
-            <a:schemeClr val="accent1"/>
-          </a:fillRef>
-          <a:effectRef idx="2">
-            <a:schemeClr val="accent1"/>
-          </a:effectRef>
-          <a:fontRef idx="minor">
-            <a:schemeClr val="lt1"/>
-          </a:fontRef>
-        </p:style>
-        <p:txBody>
-          <a:bodyPr rtlCol="0" anchor="ctr"/>
-          <a:lstStyle/>
-          <a:p>
-            <a:pPr algn="ctr"/>
-            <a:r>
-              <a:rPr lang="en-US" sz="1400" dirty="0" smtClean="0"/>
-              <a:t>Desk1</a:t>
-            </a:r>
-            <a:endParaRPr lang="en-US" sz="1400" dirty="0"/>
-          </a:p>
-        </p:txBody>
-      </p:sp>
-      <p:sp>
-        <p:nvSpPr>
-          <p:cNvPr id="92" name="Rectangle 91"/>
-          <p:cNvSpPr/>
-          <p:nvPr/>
-        </p:nvSpPr>
-        <p:spPr>
-          <a:xfrm>
-            <a:off x="4549974" y="1789176"/>
-            <a:ext cx="818386" cy="274320"/>
-          </a:xfrm>
-          <a:prstGeom prst="rect">
-            <a:avLst/>
-          </a:prstGeom>
-          <a:solidFill>
-            <a:schemeClr val="accent1"/>
-          </a:solidFill>
-        </p:spPr>
-        <p:style>
-          <a:lnRef idx="1">
-            <a:schemeClr val="accent1"/>
-          </a:lnRef>
-          <a:fillRef idx="3">
-            <a:schemeClr val="accent1"/>
-          </a:fillRef>
-          <a:effectRef idx="2">
-            <a:schemeClr val="accent1"/>
-          </a:effectRef>
-          <a:fontRef idx="minor">
-            <a:schemeClr val="lt1"/>
-          </a:fontRef>
-        </p:style>
-        <p:txBody>
-          <a:bodyPr rtlCol="0" anchor="ctr"/>
-          <a:lstStyle/>
-          <a:p>
-            <a:pPr algn="ctr"/>
-            <a:r>
-              <a:rPr lang="en-US" sz="1400" dirty="0" smtClean="0"/>
-              <a:t>Desk2</a:t>
-            </a:r>
-            <a:endParaRPr lang="en-US" sz="1400" dirty="0"/>
-          </a:p>
-        </p:txBody>
-      </p:sp>
-      <p:sp>
-        <p:nvSpPr>
-          <p:cNvPr id="93" name="Rectangle 92"/>
-          <p:cNvSpPr/>
-          <p:nvPr/>
-        </p:nvSpPr>
-        <p:spPr>
-          <a:xfrm>
-            <a:off x="5863586" y="1758412"/>
-            <a:ext cx="818386" cy="274320"/>
-          </a:xfrm>
-          <a:prstGeom prst="rect">
-            <a:avLst/>
-          </a:prstGeom>
-          <a:solidFill>
-            <a:schemeClr val="accent1"/>
-          </a:solidFill>
-        </p:spPr>
-        <p:style>
-          <a:lnRef idx="1">
-            <a:schemeClr val="accent1"/>
-          </a:lnRef>
-          <a:fillRef idx="3">
-            <a:schemeClr val="accent1"/>
-          </a:fillRef>
-          <a:effectRef idx="2">
-            <a:schemeClr val="accent1"/>
-          </a:effectRef>
-          <a:fontRef idx="minor">
-            <a:schemeClr val="lt1"/>
-          </a:fontRef>
-        </p:style>
-        <p:txBody>
-          <a:bodyPr rtlCol="0" anchor="ctr"/>
-          <a:lstStyle/>
-          <a:p>
-            <a:pPr algn="ctr"/>
-            <a:r>
-              <a:rPr lang="en-US" sz="1400" dirty="0" smtClean="0"/>
-              <a:t>Desk4</a:t>
-            </a:r>
-            <a:endParaRPr lang="en-US" sz="1400" dirty="0"/>
-          </a:p>
-        </p:txBody>
-      </p:sp>
-      <p:sp>
-        <p:nvSpPr>
-          <p:cNvPr id="94" name="Rectangle 93"/>
-          <p:cNvSpPr/>
-          <p:nvPr/>
-        </p:nvSpPr>
-        <p:spPr>
-          <a:xfrm>
-            <a:off x="7018017" y="1758412"/>
-            <a:ext cx="818386" cy="274320"/>
-          </a:xfrm>
-          <a:prstGeom prst="rect">
-            <a:avLst/>
-          </a:prstGeom>
-          <a:solidFill>
-            <a:schemeClr val="accent1"/>
-          </a:solidFill>
-        </p:spPr>
-        <p:style>
-          <a:lnRef idx="1">
-            <a:schemeClr val="accent1"/>
-          </a:lnRef>
-          <a:fillRef idx="3">
-            <a:schemeClr val="accent1"/>
-          </a:fillRef>
-          <a:effectRef idx="2">
-            <a:schemeClr val="accent1"/>
-          </a:effectRef>
-          <a:fontRef idx="minor">
-            <a:schemeClr val="lt1"/>
-          </a:fontRef>
-        </p:style>
-        <p:txBody>
-          <a:bodyPr rtlCol="0" anchor="ctr"/>
-          <a:lstStyle/>
-          <a:p>
-            <a:pPr algn="ctr"/>
-            <a:r>
-              <a:rPr lang="en-US" sz="1400" dirty="0" smtClean="0"/>
-              <a:t>Desk5</a:t>
-            </a:r>
-            <a:endParaRPr lang="en-US" sz="1400" dirty="0"/>
-          </a:p>
-        </p:txBody>
-      </p:sp>
-      <p:sp>
-        <p:nvSpPr>
-          <p:cNvPr id="95" name="Rectangle 94"/>
-          <p:cNvSpPr/>
-          <p:nvPr/>
-        </p:nvSpPr>
-        <p:spPr>
-          <a:xfrm>
-            <a:off x="3503677" y="4187192"/>
-            <a:ext cx="818386" cy="274320"/>
-          </a:xfrm>
-          <a:prstGeom prst="rect">
-            <a:avLst/>
-          </a:prstGeom>
-          <a:solidFill>
-            <a:schemeClr val="accent1"/>
-          </a:solidFill>
-        </p:spPr>
-        <p:style>
-          <a:lnRef idx="1">
-            <a:schemeClr val="accent1"/>
-          </a:lnRef>
-          <a:fillRef idx="3">
-            <a:schemeClr val="accent1"/>
-          </a:fillRef>
-          <a:effectRef idx="2">
-            <a:schemeClr val="accent1"/>
-          </a:effectRef>
-          <a:fontRef idx="minor">
-            <a:schemeClr val="lt1"/>
-          </a:fontRef>
-        </p:style>
-        <p:txBody>
-          <a:bodyPr rtlCol="0" anchor="ctr"/>
-          <a:lstStyle/>
-          <a:p>
-            <a:pPr algn="ctr"/>
-            <a:r>
-              <a:rPr lang="en-US" sz="1400" dirty="0" smtClean="0"/>
-              <a:t>Desk11</a:t>
-            </a:r>
-            <a:endParaRPr lang="en-US" sz="1400" dirty="0"/>
-          </a:p>
-        </p:txBody>
-      </p:sp>
-      <p:sp>
-        <p:nvSpPr>
-          <p:cNvPr id="96" name="Rectangle 95"/>
-          <p:cNvSpPr/>
-          <p:nvPr/>
-        </p:nvSpPr>
-        <p:spPr>
-          <a:xfrm>
-            <a:off x="4673350" y="4176763"/>
-            <a:ext cx="818386" cy="274320"/>
-          </a:xfrm>
-          <a:prstGeom prst="rect">
-            <a:avLst/>
-          </a:prstGeom>
-          <a:solidFill>
-            <a:schemeClr val="accent1"/>
-          </a:solidFill>
-        </p:spPr>
-        <p:style>
-          <a:lnRef idx="1">
-            <a:schemeClr val="accent1"/>
-          </a:lnRef>
-          <a:fillRef idx="3">
-            <a:schemeClr val="accent1"/>
-          </a:fillRef>
-          <a:effectRef idx="2">
-            <a:schemeClr val="accent1"/>
-          </a:effectRef>
-          <a:fontRef idx="minor">
-            <a:schemeClr val="lt1"/>
-          </a:fontRef>
-        </p:style>
-        <p:txBody>
-          <a:bodyPr rtlCol="0" anchor="ctr"/>
-          <a:lstStyle/>
-          <a:p>
-            <a:pPr algn="ctr"/>
-            <a:r>
-              <a:rPr lang="en-US" sz="1400" dirty="0" smtClean="0"/>
-              <a:t>Desk12</a:t>
-            </a:r>
-            <a:endParaRPr lang="en-US" sz="1400" dirty="0"/>
-          </a:p>
-        </p:txBody>
-      </p:sp>
-      <p:cxnSp>
-        <p:nvCxnSpPr>
-          <p:cNvPr id="199" name="Straight Arrow Connector 198"/>
-          <p:cNvCxnSpPr/>
-          <p:nvPr/>
-        </p:nvCxnSpPr>
-        <p:spPr>
-          <a:xfrm>
-            <a:off x="3685032" y="1372832"/>
-            <a:ext cx="36576" cy="2086118"/>
+          <a:xfrm rot="16200000" flipH="1">
+            <a:off x="1792895" y="3125055"/>
+            <a:ext cx="2159695" cy="36576"/>
           </a:xfrm>
           <a:prstGeom prst="straightConnector1">
             <a:avLst/>
@@ -7710,54 +7716,14 @@
       </p:cxnSp>
       <p:cxnSp>
         <p:nvCxnSpPr>
-          <p:cNvPr id="201" name="Straight Arrow Connector 200"/>
-          <p:cNvCxnSpPr>
-            <a:endCxn id="177" idx="1"/>
-          </p:cNvCxnSpPr>
+          <p:cNvPr id="68" name="Straight Arrow Connector 67"/>
+          <p:cNvCxnSpPr/>
           <p:nvPr/>
         </p:nvCxnSpPr>
         <p:spPr>
           <a:xfrm rot="16200000" flipH="1">
-            <a:off x="2496767" y="1660945"/>
-            <a:ext cx="2140212" cy="127916"/>
-          </a:xfrm>
-          <a:prstGeom prst="straightConnector1">
-            <a:avLst/>
-          </a:prstGeom>
-          <a:ln w="12700">
-            <a:solidFill>
-              <a:schemeClr val="tx1"/>
-            </a:solidFill>
-            <a:prstDash val="sysDash"/>
-            <a:headEnd type="arrow"/>
-            <a:tailEnd type="arrow"/>
-          </a:ln>
-        </p:spPr>
-        <p:style>
-          <a:lnRef idx="2">
-            <a:schemeClr val="accent1"/>
-          </a:lnRef>
-          <a:fillRef idx="0">
-            <a:schemeClr val="accent1"/>
-          </a:fillRef>
-          <a:effectRef idx="1">
-            <a:schemeClr val="accent1"/>
-          </a:effectRef>
-          <a:fontRef idx="minor">
-            <a:schemeClr val="tx1"/>
-          </a:fontRef>
-        </p:style>
-      </p:cxnSp>
-      <p:cxnSp>
-        <p:nvCxnSpPr>
-          <p:cNvPr id="198" name="Straight Arrow Connector 197"/>
-          <p:cNvCxnSpPr/>
-          <p:nvPr/>
-        </p:nvCxnSpPr>
-        <p:spPr>
-          <a:xfrm>
-            <a:off x="5230368" y="1372832"/>
-            <a:ext cx="36576" cy="2086118"/>
+            <a:off x="357153" y="2517979"/>
+            <a:ext cx="2227997" cy="67057"/>
           </a:xfrm>
           <a:prstGeom prst="straightConnector1">
             <a:avLst/>

</xml_diff>

<commit_message>
Kate: Added Langly ref, Redid Analogy Diagram.  Minor tweaking of conclusion
</commit_message>
<xml_diff>
--- a/code/scenarios/cdsr/trunk/papers/AAAI2012/images/outline_newDiagram.pptx
+++ b/code/scenarios/cdsr/trunk/papers/AAAI2012/images/outline_newDiagram.pptx
@@ -5283,13 +5283,154 @@
       </p:grpSpPr>
       <p:sp>
         <p:nvSpPr>
+          <p:cNvPr id="136" name="Rounded Rectangle 135"/>
+          <p:cNvSpPr/>
+          <p:nvPr/>
+        </p:nvSpPr>
+        <p:spPr>
+          <a:xfrm>
+            <a:off x="2688563" y="2577475"/>
+            <a:ext cx="2230909" cy="602822"/>
+          </a:xfrm>
+          <a:prstGeom prst="roundRect">
+            <a:avLst/>
+          </a:prstGeom>
+          <a:solidFill>
+            <a:schemeClr val="bg1">
+              <a:lumMod val="85000"/>
+              <a:alpha val="21000"/>
+            </a:schemeClr>
+          </a:solidFill>
+          <a:ln>
+            <a:noFill/>
+          </a:ln>
+        </p:spPr>
+        <p:style>
+          <a:lnRef idx="1">
+            <a:schemeClr val="accent1"/>
+          </a:lnRef>
+          <a:fillRef idx="3">
+            <a:schemeClr val="accent1"/>
+          </a:fillRef>
+          <a:effectRef idx="2">
+            <a:schemeClr val="accent1"/>
+          </a:effectRef>
+          <a:fontRef idx="minor">
+            <a:schemeClr val="lt1"/>
+          </a:fontRef>
+        </p:style>
+        <p:txBody>
+          <a:bodyPr rtlCol="0" anchor="ctr"/>
+          <a:lstStyle/>
+          <a:p>
+            <a:pPr algn="ctr"/>
+            <a:endParaRPr lang="en-US"/>
+          </a:p>
+        </p:txBody>
+      </p:sp>
+      <p:sp>
+        <p:nvSpPr>
+          <p:cNvPr id="88" name="Rounded Rectangle 87"/>
+          <p:cNvSpPr/>
+          <p:nvPr/>
+        </p:nvSpPr>
+        <p:spPr>
+          <a:xfrm>
+            <a:off x="4276943" y="3027836"/>
+            <a:ext cx="2087276" cy="602822"/>
+          </a:xfrm>
+          <a:prstGeom prst="roundRect">
+            <a:avLst/>
+          </a:prstGeom>
+          <a:solidFill>
+            <a:schemeClr val="bg1">
+              <a:lumMod val="85000"/>
+              <a:alpha val="21000"/>
+            </a:schemeClr>
+          </a:solidFill>
+          <a:ln>
+            <a:noFill/>
+          </a:ln>
+        </p:spPr>
+        <p:style>
+          <a:lnRef idx="1">
+            <a:schemeClr val="accent1"/>
+          </a:lnRef>
+          <a:fillRef idx="3">
+            <a:schemeClr val="accent1"/>
+          </a:fillRef>
+          <a:effectRef idx="2">
+            <a:schemeClr val="accent1"/>
+          </a:effectRef>
+          <a:fontRef idx="minor">
+            <a:schemeClr val="lt1"/>
+          </a:fontRef>
+        </p:style>
+        <p:txBody>
+          <a:bodyPr rtlCol="0" anchor="ctr"/>
+          <a:lstStyle/>
+          <a:p>
+            <a:pPr algn="ctr"/>
+            <a:endParaRPr lang="en-US"/>
+          </a:p>
+        </p:txBody>
+      </p:sp>
+      <p:sp>
+        <p:nvSpPr>
+          <p:cNvPr id="204" name="Rounded Rectangle 203"/>
+          <p:cNvSpPr/>
+          <p:nvPr/>
+        </p:nvSpPr>
+        <p:spPr>
+          <a:xfrm>
+            <a:off x="1218871" y="2961885"/>
+            <a:ext cx="2162886" cy="829297"/>
+          </a:xfrm>
+          <a:prstGeom prst="roundRect">
+            <a:avLst/>
+          </a:prstGeom>
+          <a:solidFill>
+            <a:schemeClr val="bg1">
+              <a:lumMod val="85000"/>
+              <a:alpha val="21000"/>
+            </a:schemeClr>
+          </a:solidFill>
+          <a:ln>
+            <a:noFill/>
+          </a:ln>
+        </p:spPr>
+        <p:style>
+          <a:lnRef idx="1">
+            <a:schemeClr val="accent1"/>
+          </a:lnRef>
+          <a:fillRef idx="3">
+            <a:schemeClr val="accent1"/>
+          </a:fillRef>
+          <a:effectRef idx="2">
+            <a:schemeClr val="accent1"/>
+          </a:effectRef>
+          <a:fontRef idx="minor">
+            <a:schemeClr val="lt1"/>
+          </a:fontRef>
+        </p:style>
+        <p:txBody>
+          <a:bodyPr rtlCol="0" anchor="ctr"/>
+          <a:lstStyle/>
+          <a:p>
+            <a:pPr algn="ctr"/>
+            <a:endParaRPr lang="en-US"/>
+          </a:p>
+        </p:txBody>
+      </p:sp>
+      <p:sp>
+        <p:nvSpPr>
           <p:cNvPr id="8" name="Oval 7"/>
           <p:cNvSpPr/>
           <p:nvPr/>
         </p:nvSpPr>
         <p:spPr>
           <a:xfrm>
-            <a:off x="1351790" y="264698"/>
+            <a:off x="1351789" y="482345"/>
             <a:ext cx="1539240" cy="485110"/>
           </a:xfrm>
           <a:prstGeom prst="ellipse">
@@ -5320,14 +5461,14 @@
             <a:pPr algn="ctr"/>
             <a:r>
               <a:rPr lang="en-US" sz="1400" dirty="0" smtClean="0"/>
-              <a:t>region</a:t>
+              <a:t>boundary</a:t>
             </a:r>
           </a:p>
           <a:p>
             <a:pPr algn="ctr"/>
             <a:r>
               <a:rPr lang="en-US" sz="1400" dirty="0" smtClean="0"/>
-              <a:t>Boundary</a:t>
+              <a:t>Segment</a:t>
             </a:r>
             <a:endParaRPr lang="en-US" sz="1400" dirty="0"/>
           </a:p>
@@ -5341,7 +5482,7 @@
         </p:nvSpPr>
         <p:spPr>
           <a:xfrm>
-            <a:off x="1379894" y="1152144"/>
+            <a:off x="1379893" y="1369791"/>
             <a:ext cx="987552" cy="285366"/>
           </a:xfrm>
           <a:prstGeom prst="rect">
@@ -5388,7 +5529,7 @@
         </p:nvCxnSpPr>
         <p:spPr>
           <a:xfrm flipH="1">
-            <a:off x="1946149" y="749808"/>
+            <a:off x="1946148" y="967455"/>
             <a:ext cx="175261" cy="402336"/>
           </a:xfrm>
           <a:prstGeom prst="straightConnector1">
@@ -5418,14 +5559,14 @@
           <p:cNvPr id="20" name="Straight Arrow Connector 19"/>
           <p:cNvCxnSpPr>
             <a:stCxn id="8" idx="6"/>
-            <a:endCxn id="142" idx="2"/>
+            <a:endCxn id="75" idx="4"/>
           </p:cNvCxnSpPr>
           <p:nvPr/>
         </p:nvCxnSpPr>
         <p:spPr>
-          <a:xfrm>
-            <a:off x="2891030" y="507253"/>
-            <a:ext cx="490727" cy="1588"/>
+          <a:xfrm flipV="1">
+            <a:off x="2891029" y="540211"/>
+            <a:ext cx="551586" cy="184689"/>
           </a:xfrm>
           <a:prstGeom prst="straightConnector1">
             <a:avLst/>
@@ -5497,7 +5638,7 @@
         </p:nvSpPr>
         <p:spPr>
           <a:xfrm rot="16200000">
-            <a:off x="579366" y="784424"/>
+            <a:off x="579365" y="1002071"/>
             <a:ext cx="1193292" cy="523220"/>
           </a:xfrm>
           <a:prstGeom prst="rect">
@@ -5567,7 +5708,7 @@
         </p:nvSpPr>
         <p:spPr>
           <a:xfrm rot="16200000">
-            <a:off x="688808" y="3279214"/>
+            <a:off x="688806" y="3580750"/>
             <a:ext cx="1230439" cy="523220"/>
           </a:xfrm>
           <a:prstGeom prst="rect">
@@ -5597,7 +5738,7 @@
         </p:nvSpPr>
         <p:spPr>
           <a:xfrm>
-            <a:off x="4508757" y="1003454"/>
+            <a:off x="4508756" y="1221101"/>
             <a:ext cx="1115568" cy="369378"/>
           </a:xfrm>
           <a:prstGeom prst="ellipse">
@@ -5644,7 +5785,7 @@
         </p:nvCxnSpPr>
         <p:spPr>
           <a:xfrm flipH="1">
-            <a:off x="4003551" y="1372832"/>
+            <a:off x="4003550" y="1590479"/>
             <a:ext cx="1062990" cy="394863"/>
           </a:xfrm>
           <a:prstGeom prst="straightConnector1">
@@ -5679,7 +5820,7 @@
         </p:nvCxnSpPr>
         <p:spPr>
           <a:xfrm>
-            <a:off x="5066541" y="1372832"/>
+            <a:off x="5066540" y="1590479"/>
             <a:ext cx="0" cy="385580"/>
           </a:xfrm>
           <a:prstGeom prst="straightConnector1">
@@ -5712,7 +5853,7 @@
         </p:nvSpPr>
         <p:spPr>
           <a:xfrm>
-            <a:off x="1176529" y="1642680"/>
+            <a:off x="1176528" y="1860327"/>
             <a:ext cx="1150620" cy="485110"/>
           </a:xfrm>
           <a:prstGeom prst="ellipse">
@@ -5767,7 +5908,7 @@
         </p:nvCxnSpPr>
         <p:spPr>
           <a:xfrm rot="5400000" flipH="1" flipV="1">
-            <a:off x="1710169" y="1479180"/>
+            <a:off x="1710168" y="1696827"/>
             <a:ext cx="205170" cy="121831"/>
           </a:xfrm>
           <a:prstGeom prst="straightConnector1">
@@ -5800,7 +5941,7 @@
         </p:nvSpPr>
         <p:spPr>
           <a:xfrm>
-            <a:off x="2532891" y="1773936"/>
+            <a:off x="2532890" y="1991583"/>
             <a:ext cx="818386" cy="274320"/>
           </a:xfrm>
           <a:prstGeom prst="rect">
@@ -5848,7 +5989,7 @@
         </p:nvCxnSpPr>
         <p:spPr>
           <a:xfrm>
-            <a:off x="2327149" y="1885235"/>
+            <a:off x="2327148" y="2102882"/>
             <a:ext cx="205742" cy="25861"/>
           </a:xfrm>
           <a:prstGeom prst="straightConnector1">
@@ -5881,7 +6022,7 @@
         </p:nvSpPr>
         <p:spPr>
           <a:xfrm>
-            <a:off x="1382271" y="2778060"/>
+            <a:off x="1382269" y="3079596"/>
             <a:ext cx="1539240" cy="485110"/>
           </a:xfrm>
           <a:prstGeom prst="ellipse">
@@ -5920,14 +6061,7 @@
             <a:pPr algn="ctr"/>
             <a:r>
               <a:rPr lang="en-US" sz="1400" dirty="0" smtClean="0"/>
-              <a:t>region</a:t>
-            </a:r>
-          </a:p>
-          <a:p>
-            <a:pPr algn="ctr"/>
-            <a:r>
-              <a:rPr lang="en-US" sz="1400" dirty="0" smtClean="0"/>
-              <a:t>Boundary</a:t>
+              <a:t>boundary Segment</a:t>
             </a:r>
             <a:endParaRPr lang="en-US" sz="1400" dirty="0"/>
           </a:p>
@@ -5941,7 +6075,7 @@
         </p:nvSpPr>
         <p:spPr>
           <a:xfrm>
-            <a:off x="1468104" y="3665506"/>
+            <a:off x="1468102" y="3967042"/>
             <a:ext cx="987552" cy="285366"/>
           </a:xfrm>
           <a:prstGeom prst="rect">
@@ -5988,7 +6122,7 @@
         </p:nvCxnSpPr>
         <p:spPr>
           <a:xfrm flipH="1">
-            <a:off x="1976630" y="3263170"/>
+            <a:off x="1976628" y="3564706"/>
             <a:ext cx="175261" cy="402336"/>
           </a:xfrm>
           <a:prstGeom prst="straightConnector1">
@@ -6027,7 +6161,7 @@
         </p:nvSpPr>
         <p:spPr>
           <a:xfrm>
-            <a:off x="1207010" y="4156042"/>
+            <a:off x="1207008" y="4457578"/>
             <a:ext cx="1150620" cy="485110"/>
           </a:xfrm>
           <a:prstGeom prst="ellipse">
@@ -6082,7 +6216,7 @@
         </p:nvCxnSpPr>
         <p:spPr>
           <a:xfrm flipV="1">
-            <a:off x="1782320" y="3950872"/>
+            <a:off x="1782318" y="4252408"/>
             <a:ext cx="179560" cy="205170"/>
           </a:xfrm>
           <a:prstGeom prst="straightConnector1">
@@ -6115,7 +6249,7 @@
         </p:nvSpPr>
         <p:spPr>
           <a:xfrm>
-            <a:off x="2563372" y="4287298"/>
+            <a:off x="2563370" y="4588834"/>
             <a:ext cx="818386" cy="274320"/>
           </a:xfrm>
           <a:prstGeom prst="rect">
@@ -6163,7 +6297,7 @@
         </p:nvCxnSpPr>
         <p:spPr>
           <a:xfrm>
-            <a:off x="2357630" y="4398597"/>
+            <a:off x="2357628" y="4700133"/>
             <a:ext cx="205742" cy="25861"/>
           </a:xfrm>
           <a:prstGeom prst="straightConnector1">
@@ -6196,8 +6330,8 @@
         </p:nvSpPr>
         <p:spPr>
           <a:xfrm>
-            <a:off x="3381757" y="322564"/>
-            <a:ext cx="1684783" cy="369378"/>
+            <a:off x="4030211" y="486117"/>
+            <a:ext cx="1947518" cy="369378"/>
           </a:xfrm>
           <a:prstGeom prst="ellipse">
             <a:avLst/>
@@ -6227,7 +6361,7 @@
             <a:pPr algn="ctr"/>
             <a:r>
               <a:rPr lang="en-US" sz="1400" dirty="0" err="1" smtClean="0"/>
-              <a:t>XMinYMostFn</a:t>
+              <a:t>YMaxXFewestFn</a:t>
             </a:r>
             <a:endParaRPr lang="en-US" sz="1400" dirty="0"/>
           </a:p>
@@ -6241,7 +6375,7 @@
         </p:nvSpPr>
         <p:spPr>
           <a:xfrm>
-            <a:off x="3326894" y="1003454"/>
+            <a:off x="3326893" y="1221101"/>
             <a:ext cx="1115568" cy="369378"/>
           </a:xfrm>
           <a:prstGeom prst="ellipse">
@@ -6288,7 +6422,7 @@
         </p:nvCxnSpPr>
         <p:spPr>
           <a:xfrm>
-            <a:off x="3884678" y="1372832"/>
+            <a:off x="3884677" y="1590479"/>
             <a:ext cx="118873" cy="394863"/>
           </a:xfrm>
           <a:prstGeom prst="straightConnector1">
@@ -6323,7 +6457,7 @@
         </p:nvCxnSpPr>
         <p:spPr>
           <a:xfrm>
-            <a:off x="3884678" y="1372832"/>
+            <a:off x="3884677" y="1590479"/>
             <a:ext cx="1181863" cy="385580"/>
           </a:xfrm>
           <a:prstGeom prst="straightConnector1">
@@ -6359,8 +6493,8 @@
         </p:nvCxnSpPr>
         <p:spPr>
           <a:xfrm rot="5400000">
-            <a:off x="3898658" y="677963"/>
-            <a:ext cx="311512" cy="339471"/>
+            <a:off x="4261521" y="478652"/>
+            <a:ext cx="365606" cy="1119293"/>
           </a:xfrm>
           <a:prstGeom prst="straightConnector1">
             <a:avLst/>
@@ -6392,7 +6526,7 @@
         </p:nvSpPr>
         <p:spPr>
           <a:xfrm>
-            <a:off x="6869426" y="967455"/>
+            <a:off x="6869425" y="1185102"/>
             <a:ext cx="1115568" cy="369378"/>
           </a:xfrm>
           <a:prstGeom prst="ellipse">
@@ -6439,7 +6573,7 @@
         </p:nvCxnSpPr>
         <p:spPr>
           <a:xfrm flipH="1">
-            <a:off x="6364220" y="1336833"/>
+            <a:off x="6364219" y="1554480"/>
             <a:ext cx="1062990" cy="394863"/>
           </a:xfrm>
           <a:prstGeom prst="straightConnector1">
@@ -6474,7 +6608,7 @@
         </p:nvCxnSpPr>
         <p:spPr>
           <a:xfrm>
-            <a:off x="7427210" y="1336833"/>
+            <a:off x="7427209" y="1554480"/>
             <a:ext cx="0" cy="385580"/>
           </a:xfrm>
           <a:prstGeom prst="straightConnector1">
@@ -6507,7 +6641,7 @@
         </p:nvSpPr>
         <p:spPr>
           <a:xfrm>
-            <a:off x="5714995" y="967455"/>
+            <a:off x="5714994" y="1185102"/>
             <a:ext cx="1115568" cy="369378"/>
           </a:xfrm>
           <a:prstGeom prst="ellipse">
@@ -6554,7 +6688,7 @@
         </p:nvCxnSpPr>
         <p:spPr>
           <a:xfrm>
-            <a:off x="6272779" y="1336833"/>
+            <a:off x="6272778" y="1554480"/>
             <a:ext cx="91441" cy="394863"/>
           </a:xfrm>
           <a:prstGeom prst="straightConnector1">
@@ -6589,7 +6723,7 @@
         </p:nvCxnSpPr>
         <p:spPr>
           <a:xfrm>
-            <a:off x="6272779" y="1336833"/>
+            <a:off x="6272778" y="1554480"/>
             <a:ext cx="1154431" cy="385580"/>
           </a:xfrm>
           <a:prstGeom prst="straightConnector1">
@@ -6622,7 +6756,7 @@
         </p:nvSpPr>
         <p:spPr>
           <a:xfrm>
-            <a:off x="4508757" y="3421805"/>
+            <a:off x="4616268" y="3817814"/>
             <a:ext cx="1115568" cy="369378"/>
           </a:xfrm>
           <a:prstGeom prst="ellipse">
@@ -6669,7 +6803,7 @@
         </p:nvCxnSpPr>
         <p:spPr>
           <a:xfrm rot="5400000">
-            <a:off x="4345759" y="3435259"/>
+            <a:off x="4453270" y="3831268"/>
             <a:ext cx="364859" cy="1076706"/>
           </a:xfrm>
           <a:prstGeom prst="straightConnector1">
@@ -6704,7 +6838,7 @@
         </p:nvCxnSpPr>
         <p:spPr>
           <a:xfrm>
-            <a:off x="5066541" y="3791183"/>
+            <a:off x="5174052" y="4187192"/>
             <a:ext cx="16002" cy="385580"/>
           </a:xfrm>
           <a:prstGeom prst="straightConnector1">
@@ -6737,8 +6871,8 @@
         </p:nvSpPr>
         <p:spPr>
           <a:xfrm>
-            <a:off x="3381757" y="2740915"/>
-            <a:ext cx="1700786" cy="369378"/>
+            <a:off x="4276942" y="3108403"/>
+            <a:ext cx="1959265" cy="369378"/>
           </a:xfrm>
           <a:prstGeom prst="ellipse">
             <a:avLst/>
@@ -6779,7 +6913,7 @@
             <a:pPr algn="ctr"/>
             <a:r>
               <a:rPr lang="en-US" sz="1400" dirty="0" err="1" smtClean="0"/>
-              <a:t>XMinYMostFn</a:t>
+              <a:t>YMaxXFewestFn</a:t>
             </a:r>
             <a:endParaRPr lang="en-US" sz="1400" dirty="0"/>
           </a:p>
@@ -6793,7 +6927,7 @@
         </p:nvSpPr>
         <p:spPr>
           <a:xfrm>
-            <a:off x="3326894" y="3421805"/>
+            <a:off x="3434405" y="3817814"/>
             <a:ext cx="1115568" cy="369378"/>
           </a:xfrm>
           <a:prstGeom prst="ellipse">
@@ -6840,7 +6974,7 @@
         </p:nvCxnSpPr>
         <p:spPr>
           <a:xfrm rot="16200000" flipH="1">
-            <a:off x="3754827" y="3921033"/>
+            <a:off x="3862338" y="4317042"/>
             <a:ext cx="364859" cy="105157"/>
           </a:xfrm>
           <a:prstGeom prst="straightConnector1">
@@ -6875,7 +7009,7 @@
         </p:nvCxnSpPr>
         <p:spPr>
           <a:xfrm>
-            <a:off x="3884678" y="3791183"/>
+            <a:off x="3992189" y="4187192"/>
             <a:ext cx="1197865" cy="385580"/>
           </a:xfrm>
           <a:prstGeom prst="straightConnector1">
@@ -6911,8 +7045,8 @@
         </p:nvCxnSpPr>
         <p:spPr>
           <a:xfrm rot="5400000">
-            <a:off x="3902658" y="3092313"/>
-            <a:ext cx="311512" cy="347472"/>
+            <a:off x="4454366" y="3015604"/>
+            <a:ext cx="340033" cy="1264386"/>
           </a:xfrm>
           <a:prstGeom prst="straightConnector1">
             <a:avLst/>
@@ -6953,8 +7087,8 @@
         </p:nvCxnSpPr>
         <p:spPr>
           <a:xfrm flipV="1">
-            <a:off x="2921511" y="2925604"/>
-            <a:ext cx="460246" cy="95011"/>
+            <a:off x="2921509" y="3293092"/>
+            <a:ext cx="1355433" cy="29059"/>
           </a:xfrm>
           <a:prstGeom prst="straightConnector1">
             <a:avLst/>
@@ -6984,82 +7118,6 @@
           </a:fontRef>
         </p:style>
       </p:cxnSp>
-      <p:cxnSp>
-        <p:nvCxnSpPr>
-          <p:cNvPr id="197" name="Straight Arrow Connector 196"/>
-          <p:cNvCxnSpPr/>
-          <p:nvPr/>
-        </p:nvCxnSpPr>
-        <p:spPr>
-          <a:xfrm>
-            <a:off x="4919472" y="2101074"/>
-            <a:ext cx="36576" cy="2086118"/>
-          </a:xfrm>
-          <a:prstGeom prst="straightConnector1">
-            <a:avLst/>
-          </a:prstGeom>
-          <a:ln w="12700">
-            <a:solidFill>
-              <a:schemeClr val="tx1"/>
-            </a:solidFill>
-            <a:prstDash val="sysDash"/>
-            <a:headEnd type="arrow"/>
-            <a:tailEnd type="arrow"/>
-          </a:ln>
-        </p:spPr>
-        <p:style>
-          <a:lnRef idx="2">
-            <a:schemeClr val="accent1"/>
-          </a:lnRef>
-          <a:fillRef idx="0">
-            <a:schemeClr val="accent1"/>
-          </a:fillRef>
-          <a:effectRef idx="1">
-            <a:schemeClr val="accent1"/>
-          </a:effectRef>
-          <a:fontRef idx="minor">
-            <a:schemeClr val="tx1"/>
-          </a:fontRef>
-        </p:style>
-      </p:cxnSp>
-      <p:cxnSp>
-        <p:nvCxnSpPr>
-          <p:cNvPr id="200" name="Straight Arrow Connector 199"/>
-          <p:cNvCxnSpPr/>
-          <p:nvPr/>
-        </p:nvCxnSpPr>
-        <p:spPr>
-          <a:xfrm>
-            <a:off x="4021838" y="2137073"/>
-            <a:ext cx="36576" cy="2086118"/>
-          </a:xfrm>
-          <a:prstGeom prst="straightConnector1">
-            <a:avLst/>
-          </a:prstGeom>
-          <a:ln w="12700">
-            <a:solidFill>
-              <a:schemeClr val="tx1"/>
-            </a:solidFill>
-            <a:prstDash val="sysDash"/>
-            <a:headEnd type="arrow"/>
-            <a:tailEnd type="arrow"/>
-          </a:ln>
-        </p:spPr>
-        <p:style>
-          <a:lnRef idx="2">
-            <a:schemeClr val="accent1"/>
-          </a:lnRef>
-          <a:fillRef idx="0">
-            <a:schemeClr val="accent1"/>
-          </a:fillRef>
-          <a:effectRef idx="1">
-            <a:schemeClr val="accent1"/>
-          </a:effectRef>
-          <a:fontRef idx="minor">
-            <a:schemeClr val="tx1"/>
-          </a:fontRef>
-        </p:style>
-      </p:cxnSp>
       <p:sp>
         <p:nvSpPr>
           <p:cNvPr id="203" name="TextBox 202"/>
@@ -7068,7 +7126,7 @@
         </p:nvSpPr>
         <p:spPr>
           <a:xfrm>
-            <a:off x="5368360" y="2795009"/>
+            <a:off x="5863585" y="3477780"/>
             <a:ext cx="2339337" cy="369332"/>
           </a:xfrm>
           <a:prstGeom prst="rect">
@@ -7087,53 +7145,6 @@
               <a:t>Candidate Inference</a:t>
             </a:r>
             <a:endParaRPr lang="en-US" b="1" dirty="0"/>
-          </a:p>
-        </p:txBody>
-      </p:sp>
-      <p:sp>
-        <p:nvSpPr>
-          <p:cNvPr id="204" name="Rounded Rectangle 203"/>
-          <p:cNvSpPr/>
-          <p:nvPr/>
-        </p:nvSpPr>
-        <p:spPr>
-          <a:xfrm>
-            <a:off x="1218873" y="2660349"/>
-            <a:ext cx="2162886" cy="829297"/>
-          </a:xfrm>
-          <a:prstGeom prst="roundRect">
-            <a:avLst/>
-          </a:prstGeom>
-          <a:solidFill>
-            <a:schemeClr val="bg1">
-              <a:lumMod val="85000"/>
-              <a:alpha val="21000"/>
-            </a:schemeClr>
-          </a:solidFill>
-          <a:ln>
-            <a:noFill/>
-          </a:ln>
-        </p:spPr>
-        <p:style>
-          <a:lnRef idx="1">
-            <a:schemeClr val="accent1"/>
-          </a:lnRef>
-          <a:fillRef idx="3">
-            <a:schemeClr val="accent1"/>
-          </a:fillRef>
-          <a:effectRef idx="2">
-            <a:schemeClr val="accent1"/>
-          </a:effectRef>
-          <a:fontRef idx="minor">
-            <a:schemeClr val="lt1"/>
-          </a:fontRef>
-        </p:style>
-        <p:txBody>
-          <a:bodyPr rtlCol="0" anchor="ctr"/>
-          <a:lstStyle/>
-          <a:p>
-            <a:pPr algn="ctr"/>
-            <a:endParaRPr lang="en-US"/>
           </a:p>
         </p:txBody>
       </p:sp>
@@ -7145,7 +7156,7 @@
         </p:nvCxnSpPr>
         <p:spPr>
           <a:xfrm>
-            <a:off x="2327149" y="749808"/>
+            <a:off x="2151889" y="984222"/>
             <a:ext cx="30481" cy="2045201"/>
           </a:xfrm>
           <a:prstGeom prst="straightConnector1">
@@ -7178,90 +7189,13 @@
       </p:cxnSp>
       <p:sp>
         <p:nvSpPr>
-          <p:cNvPr id="212" name="TextBox 211"/>
-          <p:cNvSpPr txBox="1"/>
-          <p:nvPr/>
-        </p:nvSpPr>
-        <p:spPr>
-          <a:xfrm rot="16200000">
-            <a:off x="4344195" y="2566897"/>
-            <a:ext cx="1537721" cy="307777"/>
-          </a:xfrm>
-          <a:prstGeom prst="rect">
-            <a:avLst/>
-          </a:prstGeom>
-          <a:noFill/>
-        </p:spPr>
-        <p:txBody>
-          <a:bodyPr wrap="square" rtlCol="0">
-            <a:spAutoFit/>
-          </a:bodyPr>
-          <a:lstStyle/>
-          <a:p>
-            <a:r>
-              <a:rPr lang="en-US" sz="1400" b="1" dirty="0" smtClean="0"/>
-              <a:t>correspondences</a:t>
-            </a:r>
-            <a:endParaRPr lang="en-US" sz="1400" b="1" dirty="0"/>
-          </a:p>
-        </p:txBody>
-      </p:sp>
-      <p:sp>
-        <p:nvSpPr>
-          <p:cNvPr id="88" name="Rounded Rectangle 87"/>
-          <p:cNvSpPr/>
-          <p:nvPr/>
-        </p:nvSpPr>
-        <p:spPr>
-          <a:xfrm>
-            <a:off x="3381757" y="2660348"/>
-            <a:ext cx="1848611" cy="602822"/>
-          </a:xfrm>
-          <a:prstGeom prst="roundRect">
-            <a:avLst/>
-          </a:prstGeom>
-          <a:solidFill>
-            <a:schemeClr val="bg1">
-              <a:lumMod val="85000"/>
-              <a:alpha val="21000"/>
-            </a:schemeClr>
-          </a:solidFill>
-          <a:ln>
-            <a:noFill/>
-          </a:ln>
-        </p:spPr>
-        <p:style>
-          <a:lnRef idx="1">
-            <a:schemeClr val="accent1"/>
-          </a:lnRef>
-          <a:fillRef idx="3">
-            <a:schemeClr val="accent1"/>
-          </a:fillRef>
-          <a:effectRef idx="2">
-            <a:schemeClr val="accent1"/>
-          </a:effectRef>
-          <a:fontRef idx="minor">
-            <a:schemeClr val="lt1"/>
-          </a:fontRef>
-        </p:style>
-        <p:txBody>
-          <a:bodyPr rtlCol="0" anchor="ctr"/>
-          <a:lstStyle/>
-          <a:p>
-            <a:pPr algn="ctr"/>
-            <a:endParaRPr lang="en-US"/>
-          </a:p>
-        </p:txBody>
-      </p:sp>
-      <p:sp>
-        <p:nvSpPr>
           <p:cNvPr id="91" name="Rectangle 90"/>
           <p:cNvSpPr/>
           <p:nvPr/>
         </p:nvSpPr>
         <p:spPr>
           <a:xfrm>
-            <a:off x="3503677" y="1773936"/>
+            <a:off x="3503676" y="1991583"/>
             <a:ext cx="818386" cy="274320"/>
           </a:xfrm>
           <a:prstGeom prst="rect">
@@ -7306,7 +7240,7 @@
         </p:nvSpPr>
         <p:spPr>
           <a:xfrm>
-            <a:off x="4549974" y="1789176"/>
+            <a:off x="4549973" y="2006823"/>
             <a:ext cx="818386" cy="274320"/>
           </a:xfrm>
           <a:prstGeom prst="rect">
@@ -7351,7 +7285,7 @@
         </p:nvSpPr>
         <p:spPr>
           <a:xfrm>
-            <a:off x="5863586" y="1758412"/>
+            <a:off x="5863585" y="1976059"/>
             <a:ext cx="818386" cy="274320"/>
           </a:xfrm>
           <a:prstGeom prst="rect">
@@ -7396,7 +7330,7 @@
         </p:nvSpPr>
         <p:spPr>
           <a:xfrm>
-            <a:off x="7018017" y="1758412"/>
+            <a:off x="7018016" y="1976059"/>
             <a:ext cx="818386" cy="274320"/>
           </a:xfrm>
           <a:prstGeom prst="rect">
@@ -7441,7 +7375,7 @@
         </p:nvSpPr>
         <p:spPr>
           <a:xfrm>
-            <a:off x="3503677" y="4187192"/>
+            <a:off x="3611188" y="4583201"/>
             <a:ext cx="818386" cy="274320"/>
           </a:xfrm>
           <a:prstGeom prst="rect">
@@ -7486,7 +7420,7 @@
         </p:nvSpPr>
         <p:spPr>
           <a:xfrm>
-            <a:off x="4673350" y="4176763"/>
+            <a:off x="4780861" y="4572772"/>
             <a:ext cx="818386" cy="274320"/>
           </a:xfrm>
           <a:prstGeom prst="rect">
@@ -7525,14 +7459,14 @@
       </p:sp>
       <p:cxnSp>
         <p:nvCxnSpPr>
-          <p:cNvPr id="199" name="Straight Arrow Connector 198"/>
+          <p:cNvPr id="198" name="Straight Arrow Connector 197"/>
           <p:cNvCxnSpPr/>
           <p:nvPr/>
         </p:nvCxnSpPr>
         <p:spPr>
-          <a:xfrm>
-            <a:off x="3685032" y="1372832"/>
-            <a:ext cx="36576" cy="2086118"/>
+          <a:xfrm rot="16200000" flipH="1">
+            <a:off x="4134988" y="2685859"/>
+            <a:ext cx="2227338" cy="36576"/>
           </a:xfrm>
           <a:prstGeom prst="straightConnector1">
             <a:avLst/>
@@ -7563,14 +7497,14 @@
       </p:cxnSp>
       <p:cxnSp>
         <p:nvCxnSpPr>
-          <p:cNvPr id="198" name="Straight Arrow Connector 197"/>
+          <p:cNvPr id="63" name="Straight Arrow Connector 62"/>
           <p:cNvCxnSpPr/>
           <p:nvPr/>
         </p:nvCxnSpPr>
         <p:spPr>
-          <a:xfrm>
-            <a:off x="5230368" y="1372832"/>
-            <a:ext cx="36576" cy="2086118"/>
+          <a:xfrm rot="16200000" flipH="1">
+            <a:off x="480621" y="3430454"/>
+            <a:ext cx="2206614" cy="36578"/>
           </a:xfrm>
           <a:prstGeom prst="straightConnector1">
             <a:avLst/>
@@ -7601,52 +7535,14 @@
       </p:cxnSp>
       <p:cxnSp>
         <p:nvCxnSpPr>
-          <p:cNvPr id="63" name="Straight Arrow Connector 62"/>
-          <p:cNvCxnSpPr/>
-          <p:nvPr/>
-        </p:nvCxnSpPr>
-        <p:spPr>
-          <a:xfrm>
-            <a:off x="1565638" y="2101074"/>
-            <a:ext cx="36576" cy="2086118"/>
-          </a:xfrm>
-          <a:prstGeom prst="straightConnector1">
-            <a:avLst/>
-          </a:prstGeom>
-          <a:ln w="12700">
-            <a:solidFill>
-              <a:schemeClr val="tx1"/>
-            </a:solidFill>
-            <a:prstDash val="sysDash"/>
-            <a:headEnd type="arrow"/>
-            <a:tailEnd type="arrow"/>
-          </a:ln>
-        </p:spPr>
-        <p:style>
-          <a:lnRef idx="2">
-            <a:schemeClr val="accent1"/>
-          </a:lnRef>
-          <a:fillRef idx="0">
-            <a:schemeClr val="accent1"/>
-          </a:fillRef>
-          <a:effectRef idx="1">
-            <a:schemeClr val="accent1"/>
-          </a:effectRef>
-          <a:fontRef idx="minor">
-            <a:schemeClr val="tx1"/>
-          </a:fontRef>
-        </p:style>
-      </p:cxnSp>
-      <p:cxnSp>
-        <p:nvCxnSpPr>
           <p:cNvPr id="64" name="Straight Arrow Connector 63"/>
           <p:cNvCxnSpPr/>
           <p:nvPr/>
         </p:nvCxnSpPr>
         <p:spPr>
-          <a:xfrm>
-            <a:off x="3594843" y="691942"/>
-            <a:ext cx="30481" cy="2045201"/>
+          <a:xfrm rot="16200000" flipH="1">
+            <a:off x="3919210" y="1961074"/>
+            <a:ext cx="2252909" cy="41752"/>
           </a:xfrm>
           <a:prstGeom prst="straightConnector1">
             <a:avLst/>
@@ -7683,9 +7579,9 @@
           <p:nvPr/>
         </p:nvCxnSpPr>
         <p:spPr>
-          <a:xfrm rot="16200000" flipH="1">
-            <a:off x="1792895" y="3125055"/>
-            <a:ext cx="2159695" cy="36576"/>
+          <a:xfrm rot="5400000">
+            <a:off x="1677035" y="3411413"/>
+            <a:ext cx="2338454" cy="16389"/>
           </a:xfrm>
           <a:prstGeom prst="straightConnector1">
             <a:avLst/>
@@ -7722,8 +7618,8 @@
         </p:nvCxnSpPr>
         <p:spPr>
           <a:xfrm rot="16200000" flipH="1">
-            <a:off x="357153" y="2517979"/>
-            <a:ext cx="2227997" cy="67057"/>
+            <a:off x="315209" y="2777570"/>
+            <a:ext cx="2311888" cy="67060"/>
           </a:xfrm>
           <a:prstGeom prst="straightConnector1">
             <a:avLst/>
@@ -7734,6 +7630,444 @@
             </a:solidFill>
             <a:prstDash val="sysDash"/>
             <a:headEnd type="arrow"/>
+            <a:tailEnd type="arrow"/>
+          </a:ln>
+        </p:spPr>
+        <p:style>
+          <a:lnRef idx="2">
+            <a:schemeClr val="accent1"/>
+          </a:lnRef>
+          <a:fillRef idx="0">
+            <a:schemeClr val="accent1"/>
+          </a:fillRef>
+          <a:effectRef idx="1">
+            <a:schemeClr val="accent1"/>
+          </a:effectRef>
+          <a:fontRef idx="minor">
+            <a:schemeClr val="tx1"/>
+          </a:fontRef>
+        </p:style>
+      </p:cxnSp>
+      <p:sp>
+        <p:nvSpPr>
+          <p:cNvPr id="212" name="TextBox 211"/>
+          <p:cNvSpPr txBox="1"/>
+          <p:nvPr/>
+        </p:nvSpPr>
+        <p:spPr>
+          <a:xfrm rot="16200000">
+            <a:off x="4615396" y="2205451"/>
+            <a:ext cx="1537721" cy="307777"/>
+          </a:xfrm>
+          <a:prstGeom prst="rect">
+            <a:avLst/>
+          </a:prstGeom>
+          <a:noFill/>
+        </p:spPr>
+        <p:txBody>
+          <a:bodyPr wrap="square" rtlCol="0">
+            <a:spAutoFit/>
+          </a:bodyPr>
+          <a:lstStyle/>
+          <a:p>
+            <a:r>
+              <a:rPr lang="en-US" sz="1400" b="1" dirty="0" smtClean="0"/>
+              <a:t>correspondences</a:t>
+            </a:r>
+            <a:endParaRPr lang="en-US" sz="1400" b="1" dirty="0"/>
+          </a:p>
+        </p:txBody>
+      </p:sp>
+      <p:cxnSp>
+        <p:nvCxnSpPr>
+          <p:cNvPr id="197" name="Straight Arrow Connector 196"/>
+          <p:cNvCxnSpPr/>
+          <p:nvPr/>
+        </p:nvCxnSpPr>
+        <p:spPr>
+          <a:xfrm rot="16200000" flipH="1">
+            <a:off x="3984736" y="3215879"/>
+            <a:ext cx="1906049" cy="36576"/>
+          </a:xfrm>
+          <a:prstGeom prst="straightConnector1">
+            <a:avLst/>
+          </a:prstGeom>
+          <a:ln w="12700">
+            <a:solidFill>
+              <a:schemeClr val="tx1"/>
+            </a:solidFill>
+            <a:prstDash val="sysDash"/>
+            <a:headEnd type="arrow"/>
+            <a:tailEnd type="arrow"/>
+          </a:ln>
+        </p:spPr>
+        <p:style>
+          <a:lnRef idx="2">
+            <a:schemeClr val="accent1"/>
+          </a:lnRef>
+          <a:fillRef idx="0">
+            <a:schemeClr val="accent1"/>
+          </a:fillRef>
+          <a:effectRef idx="1">
+            <a:schemeClr val="accent1"/>
+          </a:effectRef>
+          <a:fontRef idx="minor">
+            <a:schemeClr val="tx1"/>
+          </a:fontRef>
+        </p:style>
+      </p:cxnSp>
+      <p:sp>
+        <p:nvSpPr>
+          <p:cNvPr id="75" name="Oval 74"/>
+          <p:cNvSpPr/>
+          <p:nvPr/>
+        </p:nvSpPr>
+        <p:spPr>
+          <a:xfrm>
+            <a:off x="2455656" y="170833"/>
+            <a:ext cx="1973918" cy="369378"/>
+          </a:xfrm>
+          <a:prstGeom prst="ellipse">
+            <a:avLst/>
+          </a:prstGeom>
+          <a:solidFill>
+            <a:schemeClr val="accent1"/>
+          </a:solidFill>
+        </p:spPr>
+        <p:style>
+          <a:lnRef idx="1">
+            <a:schemeClr val="accent1"/>
+          </a:lnRef>
+          <a:fillRef idx="3">
+            <a:schemeClr val="accent1"/>
+          </a:fillRef>
+          <a:effectRef idx="2">
+            <a:schemeClr val="accent1"/>
+          </a:effectRef>
+          <a:fontRef idx="minor">
+            <a:schemeClr val="lt1"/>
+          </a:fontRef>
+        </p:style>
+        <p:txBody>
+          <a:bodyPr rtlCol="0" anchor="ctr"/>
+          <a:lstStyle/>
+          <a:p>
+            <a:pPr algn="ctr"/>
+            <a:r>
+              <a:rPr lang="en-US" sz="1400" dirty="0" err="1" smtClean="0"/>
+              <a:t>YMinXFewestFn</a:t>
+            </a:r>
+            <a:endParaRPr lang="en-US" sz="1400" dirty="0"/>
+          </a:p>
+        </p:txBody>
+      </p:sp>
+      <p:cxnSp>
+        <p:nvCxnSpPr>
+          <p:cNvPr id="79" name="Straight Arrow Connector 78"/>
+          <p:cNvCxnSpPr>
+            <a:stCxn id="8" idx="6"/>
+            <a:endCxn id="142" idx="2"/>
+          </p:cNvCxnSpPr>
+          <p:nvPr/>
+        </p:nvCxnSpPr>
+        <p:spPr>
+          <a:xfrm flipV="1">
+            <a:off x="2891029" y="670806"/>
+            <a:ext cx="1139182" cy="54094"/>
+          </a:xfrm>
+          <a:prstGeom prst="straightConnector1">
+            <a:avLst/>
+          </a:prstGeom>
+          <a:ln>
+            <a:tailEnd type="arrow"/>
+          </a:ln>
+        </p:spPr>
+        <p:style>
+          <a:lnRef idx="2">
+            <a:schemeClr val="accent1"/>
+          </a:lnRef>
+          <a:fillRef idx="0">
+            <a:schemeClr val="accent1"/>
+          </a:fillRef>
+          <a:effectRef idx="1">
+            <a:schemeClr val="accent1"/>
+          </a:effectRef>
+          <a:fontRef idx="minor">
+            <a:schemeClr val="tx1"/>
+          </a:fontRef>
+        </p:style>
+      </p:cxnSp>
+      <p:cxnSp>
+        <p:nvCxnSpPr>
+          <p:cNvPr id="82" name="Straight Arrow Connector 81"/>
+          <p:cNvCxnSpPr>
+            <a:stCxn id="75" idx="4"/>
+            <a:endCxn id="154" idx="0"/>
+          </p:cNvCxnSpPr>
+          <p:nvPr/>
+        </p:nvCxnSpPr>
+        <p:spPr>
+          <a:xfrm rot="16200000" flipH="1">
+            <a:off x="3323201" y="659625"/>
+            <a:ext cx="680890" cy="442062"/>
+          </a:xfrm>
+          <a:prstGeom prst="straightConnector1">
+            <a:avLst/>
+          </a:prstGeom>
+          <a:ln>
+            <a:tailEnd type="arrow"/>
+          </a:ln>
+        </p:spPr>
+        <p:style>
+          <a:lnRef idx="2">
+            <a:schemeClr val="accent1"/>
+          </a:lnRef>
+          <a:fillRef idx="0">
+            <a:schemeClr val="accent1"/>
+          </a:fillRef>
+          <a:effectRef idx="1">
+            <a:schemeClr val="accent1"/>
+          </a:effectRef>
+          <a:fontRef idx="minor">
+            <a:schemeClr val="tx1"/>
+          </a:fontRef>
+        </p:style>
+      </p:cxnSp>
+      <p:sp>
+        <p:nvSpPr>
+          <p:cNvPr id="98" name="Oval 97"/>
+          <p:cNvSpPr/>
+          <p:nvPr/>
+        </p:nvSpPr>
+        <p:spPr>
+          <a:xfrm>
+            <a:off x="2838067" y="2739025"/>
+            <a:ext cx="1942794" cy="369378"/>
+          </a:xfrm>
+          <a:prstGeom prst="ellipse">
+            <a:avLst/>
+          </a:prstGeom>
+          <a:solidFill>
+            <a:schemeClr val="accent2"/>
+          </a:solidFill>
+          <a:ln w="38100" cap="flat" cmpd="sng" algn="ctr">
+            <a:solidFill>
+              <a:schemeClr val="accent2">
+                <a:lumMod val="50000"/>
+              </a:schemeClr>
+            </a:solidFill>
+            <a:prstDash val="sysDash"/>
+            <a:round/>
+            <a:headEnd type="none" w="med" len="med"/>
+            <a:tailEnd type="none" w="med" len="med"/>
+          </a:ln>
+        </p:spPr>
+        <p:style>
+          <a:lnRef idx="1">
+            <a:schemeClr val="accent1"/>
+          </a:lnRef>
+          <a:fillRef idx="3">
+            <a:schemeClr val="accent1"/>
+          </a:fillRef>
+          <a:effectRef idx="2">
+            <a:schemeClr val="accent1"/>
+          </a:effectRef>
+          <a:fontRef idx="minor">
+            <a:schemeClr val="lt1"/>
+          </a:fontRef>
+        </p:style>
+        <p:txBody>
+          <a:bodyPr rtlCol="0" anchor="ctr"/>
+          <a:lstStyle/>
+          <a:p>
+            <a:pPr algn="ctr"/>
+            <a:r>
+              <a:rPr lang="en-US" sz="1400" dirty="0" err="1" smtClean="0"/>
+              <a:t>YMinXFewestFn</a:t>
+            </a:r>
+            <a:endParaRPr lang="en-US" sz="1400" dirty="0"/>
+          </a:p>
+        </p:txBody>
+      </p:sp>
+      <p:cxnSp>
+        <p:nvCxnSpPr>
+          <p:cNvPr id="200" name="Straight Arrow Connector 199"/>
+          <p:cNvCxnSpPr/>
+          <p:nvPr/>
+        </p:nvCxnSpPr>
+        <p:spPr>
+          <a:xfrm rot="5400000">
+            <a:off x="2856407" y="3405139"/>
+            <a:ext cx="2317296" cy="38829"/>
+          </a:xfrm>
+          <a:prstGeom prst="straightConnector1">
+            <a:avLst/>
+          </a:prstGeom>
+          <a:ln w="12700">
+            <a:solidFill>
+              <a:schemeClr val="tx1"/>
+            </a:solidFill>
+            <a:prstDash val="sysDash"/>
+            <a:headEnd type="arrow"/>
+            <a:tailEnd type="arrow"/>
+          </a:ln>
+        </p:spPr>
+        <p:style>
+          <a:lnRef idx="2">
+            <a:schemeClr val="accent1"/>
+          </a:lnRef>
+          <a:fillRef idx="0">
+            <a:schemeClr val="accent1"/>
+          </a:fillRef>
+          <a:effectRef idx="1">
+            <a:schemeClr val="accent1"/>
+          </a:effectRef>
+          <a:fontRef idx="minor">
+            <a:schemeClr val="tx1"/>
+          </a:fontRef>
+        </p:style>
+      </p:cxnSp>
+      <p:cxnSp>
+        <p:nvCxnSpPr>
+          <p:cNvPr id="199" name="Straight Arrow Connector 198"/>
+          <p:cNvCxnSpPr/>
+          <p:nvPr/>
+        </p:nvCxnSpPr>
+        <p:spPr>
+          <a:xfrm rot="16200000" flipH="1">
+            <a:off x="2571652" y="2667860"/>
+            <a:ext cx="2263337" cy="36576"/>
+          </a:xfrm>
+          <a:prstGeom prst="straightConnector1">
+            <a:avLst/>
+          </a:prstGeom>
+          <a:ln w="12700">
+            <a:solidFill>
+              <a:schemeClr val="tx1"/>
+            </a:solidFill>
+            <a:prstDash val="sysDash"/>
+            <a:headEnd type="arrow"/>
+            <a:tailEnd type="arrow"/>
+          </a:ln>
+        </p:spPr>
+        <p:style>
+          <a:lnRef idx="2">
+            <a:schemeClr val="accent1"/>
+          </a:lnRef>
+          <a:fillRef idx="0">
+            <a:schemeClr val="accent1"/>
+          </a:fillRef>
+          <a:effectRef idx="1">
+            <a:schemeClr val="accent1"/>
+          </a:effectRef>
+          <a:fontRef idx="minor">
+            <a:schemeClr val="tx1"/>
+          </a:fontRef>
+        </p:style>
+      </p:cxnSp>
+      <p:cxnSp>
+        <p:nvCxnSpPr>
+          <p:cNvPr id="125" name="Straight Arrow Connector 124"/>
+          <p:cNvCxnSpPr/>
+          <p:nvPr/>
+        </p:nvCxnSpPr>
+        <p:spPr>
+          <a:xfrm rot="16200000" flipH="1">
+            <a:off x="2276179" y="1645789"/>
+            <a:ext cx="2252909" cy="41752"/>
+          </a:xfrm>
+          <a:prstGeom prst="straightConnector1">
+            <a:avLst/>
+          </a:prstGeom>
+          <a:ln w="34925">
+            <a:solidFill>
+              <a:schemeClr val="accent4">
+                <a:lumMod val="75000"/>
+              </a:schemeClr>
+            </a:solidFill>
+            <a:prstDash val="sysDot"/>
+            <a:tailEnd type="arrow"/>
+          </a:ln>
+        </p:spPr>
+        <p:style>
+          <a:lnRef idx="2">
+            <a:schemeClr val="accent1"/>
+          </a:lnRef>
+          <a:fillRef idx="0">
+            <a:schemeClr val="accent1"/>
+          </a:fillRef>
+          <a:effectRef idx="1">
+            <a:schemeClr val="accent1"/>
+          </a:effectRef>
+          <a:fontRef idx="minor">
+            <a:schemeClr val="tx1"/>
+          </a:fontRef>
+        </p:style>
+      </p:cxnSp>
+      <p:cxnSp>
+        <p:nvCxnSpPr>
+          <p:cNvPr id="126" name="Straight Arrow Connector 125"/>
+          <p:cNvCxnSpPr>
+            <a:stCxn id="120" idx="6"/>
+          </p:cNvCxnSpPr>
+          <p:nvPr/>
+        </p:nvCxnSpPr>
+        <p:spPr>
+          <a:xfrm flipV="1">
+            <a:off x="2921509" y="3108406"/>
+            <a:ext cx="689679" cy="213745"/>
+          </a:xfrm>
+          <a:prstGeom prst="straightConnector1">
+            <a:avLst/>
+          </a:prstGeom>
+          <a:ln>
+            <a:solidFill>
+              <a:schemeClr val="accent2">
+                <a:lumMod val="75000"/>
+              </a:schemeClr>
+            </a:solidFill>
+            <a:prstDash val="sysDash"/>
+            <a:tailEnd type="arrow"/>
+          </a:ln>
+        </p:spPr>
+        <p:style>
+          <a:lnRef idx="2">
+            <a:schemeClr val="accent1"/>
+          </a:lnRef>
+          <a:fillRef idx="0">
+            <a:schemeClr val="accent1"/>
+          </a:fillRef>
+          <a:effectRef idx="1">
+            <a:schemeClr val="accent1"/>
+          </a:effectRef>
+          <a:fontRef idx="minor">
+            <a:schemeClr val="tx1"/>
+          </a:fontRef>
+        </p:style>
+      </p:cxnSp>
+      <p:cxnSp>
+        <p:nvCxnSpPr>
+          <p:cNvPr id="129" name="Straight Arrow Connector 128"/>
+          <p:cNvCxnSpPr>
+            <a:endCxn id="178" idx="0"/>
+          </p:cNvCxnSpPr>
+          <p:nvPr/>
+        </p:nvCxnSpPr>
+        <p:spPr>
+          <a:xfrm rot="16200000" flipH="1">
+            <a:off x="3446984" y="3272609"/>
+            <a:ext cx="709408" cy="381001"/>
+          </a:xfrm>
+          <a:prstGeom prst="straightConnector1">
+            <a:avLst/>
+          </a:prstGeom>
+          <a:ln>
+            <a:solidFill>
+              <a:schemeClr val="accent2">
+                <a:lumMod val="75000"/>
+              </a:schemeClr>
+            </a:solidFill>
+            <a:prstDash val="sysDash"/>
             <a:tailEnd type="arrow"/>
           </a:ln>
         </p:spPr>

</xml_diff>